<commit_message>
Added a conclusion slide to Palin's Presentation
</commit_message>
<xml_diff>
--- a/Presentation-Palin.pptx
+++ b/Presentation-Palin.pptx
@@ -10,6 +10,7 @@
     <p:sldId id="258" r:id="rId4"/>
     <p:sldId id="259" r:id="rId5"/>
     <p:sldId id="260" r:id="rId6"/>
+    <p:sldId id="261" r:id="rId7"/>
   </p:sldIdLst>
   <p:sldSz cx="12192000" cy="6858000"/>
   <p:notesSz cx="6858000" cy="9144000"/>
@@ -924,7 +925,7 @@
           <a:p>
             <a:fld id="{5E43106B-013B-4A69-8C6E-DAED37B9AC70}" type="datetimeFigureOut">
               <a:rPr lang="en-NZ" smtClean="0"/>
-              <a:t>10/06/2022</a:t>
+              <a:t>15/06/2022</a:t>
             </a:fld>
             <a:endParaRPr lang="en-NZ"/>
           </a:p>
@@ -1141,7 +1142,7 @@
           <a:p>
             <a:fld id="{5E43106B-013B-4A69-8C6E-DAED37B9AC70}" type="datetimeFigureOut">
               <a:rPr lang="en-NZ" smtClean="0"/>
-              <a:t>10/06/2022</a:t>
+              <a:t>15/06/2022</a:t>
             </a:fld>
             <a:endParaRPr lang="en-NZ"/>
           </a:p>
@@ -1362,7 +1363,7 @@
           <a:p>
             <a:fld id="{5E43106B-013B-4A69-8C6E-DAED37B9AC70}" type="datetimeFigureOut">
               <a:rPr lang="en-NZ" smtClean="0"/>
-              <a:t>10/06/2022</a:t>
+              <a:t>15/06/2022</a:t>
             </a:fld>
             <a:endParaRPr lang="en-NZ"/>
           </a:p>
@@ -1569,7 +1570,7 @@
           <a:p>
             <a:fld id="{5E43106B-013B-4A69-8C6E-DAED37B9AC70}" type="datetimeFigureOut">
               <a:rPr lang="en-NZ" smtClean="0"/>
-              <a:t>10/06/2022</a:t>
+              <a:t>15/06/2022</a:t>
             </a:fld>
             <a:endParaRPr lang="en-NZ"/>
           </a:p>
@@ -1854,7 +1855,7 @@
           <a:p>
             <a:fld id="{5E43106B-013B-4A69-8C6E-DAED37B9AC70}" type="datetimeFigureOut">
               <a:rPr lang="en-NZ" smtClean="0"/>
-              <a:t>10/06/2022</a:t>
+              <a:t>15/06/2022</a:t>
             </a:fld>
             <a:endParaRPr lang="en-NZ"/>
           </a:p>
@@ -2128,7 +2129,7 @@
           <a:p>
             <a:fld id="{5E43106B-013B-4A69-8C6E-DAED37B9AC70}" type="datetimeFigureOut">
               <a:rPr lang="en-NZ" smtClean="0"/>
-              <a:t>10/06/2022</a:t>
+              <a:t>15/06/2022</a:t>
             </a:fld>
             <a:endParaRPr lang="en-NZ"/>
           </a:p>
@@ -2550,7 +2551,7 @@
           <a:p>
             <a:fld id="{5E43106B-013B-4A69-8C6E-DAED37B9AC70}" type="datetimeFigureOut">
               <a:rPr lang="en-NZ" smtClean="0"/>
-              <a:t>10/06/2022</a:t>
+              <a:t>15/06/2022</a:t>
             </a:fld>
             <a:endParaRPr lang="en-NZ"/>
           </a:p>
@@ -2705,7 +2706,7 @@
           <a:p>
             <a:fld id="{5E43106B-013B-4A69-8C6E-DAED37B9AC70}" type="datetimeFigureOut">
               <a:rPr lang="en-NZ" smtClean="0"/>
-              <a:t>10/06/2022</a:t>
+              <a:t>15/06/2022</a:t>
             </a:fld>
             <a:endParaRPr lang="en-NZ"/>
           </a:p>
@@ -2837,7 +2838,7 @@
           <a:p>
             <a:fld id="{5E43106B-013B-4A69-8C6E-DAED37B9AC70}" type="datetimeFigureOut">
               <a:rPr lang="en-NZ" smtClean="0"/>
-              <a:t>10/06/2022</a:t>
+              <a:t>15/06/2022</a:t>
             </a:fld>
             <a:endParaRPr lang="en-NZ"/>
           </a:p>
@@ -3088,7 +3089,7 @@
           <a:p>
             <a:fld id="{5E43106B-013B-4A69-8C6E-DAED37B9AC70}" type="datetimeFigureOut">
               <a:rPr lang="en-NZ" smtClean="0"/>
-              <a:t>10/06/2022</a:t>
+              <a:t>15/06/2022</a:t>
             </a:fld>
             <a:endParaRPr lang="en-NZ"/>
           </a:p>
@@ -3543,7 +3544,7 @@
           <a:p>
             <a:fld id="{5E43106B-013B-4A69-8C6E-DAED37B9AC70}" type="datetimeFigureOut">
               <a:rPr lang="en-NZ" smtClean="0"/>
-              <a:t>10/06/2022</a:t>
+              <a:t>15/06/2022</a:t>
             </a:fld>
             <a:endParaRPr lang="en-NZ"/>
           </a:p>
@@ -3870,7 +3871,7 @@
           <a:p>
             <a:fld id="{5E43106B-013B-4A69-8C6E-DAED37B9AC70}" type="datetimeFigureOut">
               <a:rPr lang="en-NZ" smtClean="0"/>
-              <a:t>10/06/2022</a:t>
+              <a:t>15/06/2022</a:t>
             </a:fld>
             <a:endParaRPr lang="en-NZ"/>
           </a:p>
@@ -7125,6 +7126,241 @@
 </p:sld>
 </file>
 
+<file path=ppt/slides/slide6.xml><?xml version="1.0" encoding="utf-8"?>
+<p:sld xmlns:a="http://schemas.openxmlformats.org/drawingml/2006/main" xmlns:r="http://schemas.openxmlformats.org/officeDocument/2006/relationships" xmlns:p="http://schemas.openxmlformats.org/presentationml/2006/main">
+  <p:cSld>
+    <p:spTree>
+      <p:nvGrpSpPr>
+        <p:cNvPr id="1" name=""/>
+        <p:cNvGrpSpPr/>
+        <p:nvPr/>
+      </p:nvGrpSpPr>
+      <p:grpSpPr>
+        <a:xfrm>
+          <a:off x="0" y="0"/>
+          <a:ext cx="0" cy="0"/>
+          <a:chOff x="0" y="0"/>
+          <a:chExt cx="0" cy="0"/>
+        </a:xfrm>
+      </p:grpSpPr>
+      <p:sp>
+        <p:nvSpPr>
+          <p:cNvPr id="2" name="Title 1">
+            <a:extLst>
+              <a:ext uri="{FF2B5EF4-FFF2-40B4-BE49-F238E27FC236}">
+                <a16:creationId xmlns:a16="http://schemas.microsoft.com/office/drawing/2014/main" id="{EAAD6B3C-119B-FFCB-A72E-C36399B97F22}"/>
+              </a:ext>
+            </a:extLst>
+          </p:cNvPr>
+          <p:cNvSpPr>
+            <a:spLocks noGrp="1"/>
+          </p:cNvSpPr>
+          <p:nvPr>
+            <p:ph type="title"/>
+          </p:nvPr>
+        </p:nvSpPr>
+        <p:spPr/>
+        <p:txBody>
+          <a:bodyPr/>
+          <a:lstStyle/>
+          <a:p>
+            <a:r>
+              <a:rPr lang="en-NZ" dirty="0"/>
+              <a:t>Bug fixing</a:t>
+            </a:r>
+          </a:p>
+        </p:txBody>
+      </p:sp>
+      <p:sp>
+        <p:nvSpPr>
+          <p:cNvPr id="3" name="Content Placeholder 2">
+            <a:extLst>
+              <a:ext uri="{FF2B5EF4-FFF2-40B4-BE49-F238E27FC236}">
+                <a16:creationId xmlns:a16="http://schemas.microsoft.com/office/drawing/2014/main" id="{A7A20B00-F594-8DEA-7424-345B874C3882}"/>
+              </a:ext>
+            </a:extLst>
+          </p:cNvPr>
+          <p:cNvSpPr>
+            <a:spLocks noGrp="1"/>
+          </p:cNvSpPr>
+          <p:nvPr>
+            <p:ph idx="1"/>
+          </p:nvPr>
+        </p:nvSpPr>
+        <p:spPr/>
+        <p:txBody>
+          <a:bodyPr/>
+          <a:lstStyle/>
+          <a:p>
+            <a:r>
+              <a:rPr lang="en-NZ" dirty="0"/>
+              <a:t>In conclusion:</a:t>
+            </a:r>
+          </a:p>
+          <a:p>
+            <a:endParaRPr lang="en-NZ" dirty="0"/>
+          </a:p>
+          <a:p>
+            <a:r>
+              <a:rPr lang="en-NZ" dirty="0"/>
+              <a:t>It’s important.</a:t>
+            </a:r>
+          </a:p>
+          <a:p>
+            <a:endParaRPr lang="en-NZ" dirty="0"/>
+          </a:p>
+          <a:p>
+            <a:r>
+              <a:rPr lang="en-NZ" dirty="0"/>
+              <a:t>They’ll be back.</a:t>
+            </a:r>
+          </a:p>
+        </p:txBody>
+      </p:sp>
+    </p:spTree>
+    <p:extLst>
+      <p:ext uri="{BB962C8B-B14F-4D97-AF65-F5344CB8AC3E}">
+        <p14:creationId xmlns:p14="http://schemas.microsoft.com/office/powerpoint/2010/main" val="3182084768"/>
+      </p:ext>
+    </p:extLst>
+  </p:cSld>
+  <p:clrMapOvr>
+    <a:masterClrMapping/>
+  </p:clrMapOvr>
+  <p:timing>
+    <p:tnLst>
+      <p:par>
+        <p:cTn id="1" dur="indefinite" restart="never" nodeType="tmRoot">
+          <p:childTnLst>
+            <p:seq concurrent="1" nextAc="seek">
+              <p:cTn id="2" dur="indefinite" nodeType="mainSeq">
+                <p:childTnLst>
+                  <p:par>
+                    <p:cTn id="3" fill="hold">
+                      <p:stCondLst>
+                        <p:cond delay="indefinite"/>
+                      </p:stCondLst>
+                      <p:childTnLst>
+                        <p:par>
+                          <p:cTn id="4" fill="hold">
+                            <p:stCondLst>
+                              <p:cond delay="0"/>
+                            </p:stCondLst>
+                            <p:childTnLst>
+                              <p:par>
+                                <p:cTn id="5" presetID="1" presetClass="entr" presetSubtype="0" fill="hold" grpId="0" nodeType="clickEffect">
+                                  <p:stCondLst>
+                                    <p:cond delay="0"/>
+                                  </p:stCondLst>
+                                  <p:childTnLst>
+                                    <p:set>
+                                      <p:cBhvr>
+                                        <p:cTn id="6" dur="1" fill="hold">
+                                          <p:stCondLst>
+                                            <p:cond delay="0"/>
+                                          </p:stCondLst>
+                                        </p:cTn>
+                                        <p:tgtEl>
+                                          <p:spTgt spid="3">
+                                            <p:txEl>
+                                              <p:pRg st="2" end="2"/>
+                                            </p:txEl>
+                                          </p:spTgt>
+                                        </p:tgtEl>
+                                        <p:attrNameLst>
+                                          <p:attrName>style.visibility</p:attrName>
+                                        </p:attrNameLst>
+                                      </p:cBhvr>
+                                      <p:to>
+                                        <p:strVal val="visible"/>
+                                      </p:to>
+                                    </p:set>
+                                  </p:childTnLst>
+                                </p:cTn>
+                              </p:par>
+                            </p:childTnLst>
+                          </p:cTn>
+                        </p:par>
+                      </p:childTnLst>
+                    </p:cTn>
+                  </p:par>
+                  <p:par>
+                    <p:cTn id="7" fill="hold">
+                      <p:stCondLst>
+                        <p:cond delay="indefinite"/>
+                      </p:stCondLst>
+                      <p:childTnLst>
+                        <p:par>
+                          <p:cTn id="8" fill="hold">
+                            <p:stCondLst>
+                              <p:cond delay="0"/>
+                            </p:stCondLst>
+                            <p:childTnLst>
+                              <p:par>
+                                <p:cTn id="9" presetID="1" presetClass="entr" presetSubtype="0" fill="hold" grpId="0" nodeType="clickEffect">
+                                  <p:stCondLst>
+                                    <p:cond delay="0"/>
+                                  </p:stCondLst>
+                                  <p:childTnLst>
+                                    <p:set>
+                                      <p:cBhvr>
+                                        <p:cTn id="10" dur="1" fill="hold">
+                                          <p:stCondLst>
+                                            <p:cond delay="0"/>
+                                          </p:stCondLst>
+                                        </p:cTn>
+                                        <p:tgtEl>
+                                          <p:spTgt spid="3">
+                                            <p:txEl>
+                                              <p:pRg st="4" end="4"/>
+                                            </p:txEl>
+                                          </p:spTgt>
+                                        </p:tgtEl>
+                                        <p:attrNameLst>
+                                          <p:attrName>style.visibility</p:attrName>
+                                        </p:attrNameLst>
+                                      </p:cBhvr>
+                                      <p:to>
+                                        <p:strVal val="visible"/>
+                                      </p:to>
+                                    </p:set>
+                                  </p:childTnLst>
+                                </p:cTn>
+                              </p:par>
+                            </p:childTnLst>
+                          </p:cTn>
+                        </p:par>
+                      </p:childTnLst>
+                    </p:cTn>
+                  </p:par>
+                </p:childTnLst>
+              </p:cTn>
+              <p:prevCondLst>
+                <p:cond evt="onPrev" delay="0">
+                  <p:tgtEl>
+                    <p:sldTgt/>
+                  </p:tgtEl>
+                </p:cond>
+              </p:prevCondLst>
+              <p:nextCondLst>
+                <p:cond evt="onNext" delay="0">
+                  <p:tgtEl>
+                    <p:sldTgt/>
+                  </p:tgtEl>
+                </p:cond>
+              </p:nextCondLst>
+            </p:seq>
+          </p:childTnLst>
+        </p:cTn>
+      </p:par>
+    </p:tnLst>
+    <p:bldLst>
+      <p:bldP spid="3" grpId="0" uiExpand="1" build="p"/>
+    </p:bldLst>
+  </p:timing>
+</p:sld>
+</file>
+
 <file path=ppt/theme/theme1.xml><?xml version="1.0" encoding="utf-8"?>
 <a:theme xmlns:a="http://schemas.openxmlformats.org/drawingml/2006/main" name="Gallery">
   <a:themeElements>

</xml_diff>